<commit_message>
Fixed image references in Summary docs
</commit_message>
<xml_diff>
--- a/docs/_static/diagrams1.pptx
+++ b/docs/_static/diagrams1.pptx
@@ -243,7 +243,7 @@
           <a:p>
             <a:fld id="{1A73724E-0661-4337-B8C0-DE958CD8325F}" type="datetimeFigureOut">
               <a:rPr lang="en-US" smtClean="0"/>
-              <a:t>9/1/2016</a:t>
+              <a:t>1/6/2018</a:t>
             </a:fld>
             <a:endParaRPr lang="en-US"/>
           </a:p>
@@ -413,7 +413,7 @@
           <a:p>
             <a:fld id="{1A73724E-0661-4337-B8C0-DE958CD8325F}" type="datetimeFigureOut">
               <a:rPr lang="en-US" smtClean="0"/>
-              <a:t>9/1/2016</a:t>
+              <a:t>1/6/2018</a:t>
             </a:fld>
             <a:endParaRPr lang="en-US"/>
           </a:p>
@@ -593,7 +593,7 @@
           <a:p>
             <a:fld id="{1A73724E-0661-4337-B8C0-DE958CD8325F}" type="datetimeFigureOut">
               <a:rPr lang="en-US" smtClean="0"/>
-              <a:t>9/1/2016</a:t>
+              <a:t>1/6/2018</a:t>
             </a:fld>
             <a:endParaRPr lang="en-US"/>
           </a:p>
@@ -763,7 +763,7 @@
           <a:p>
             <a:fld id="{1A73724E-0661-4337-B8C0-DE958CD8325F}" type="datetimeFigureOut">
               <a:rPr lang="en-US" smtClean="0"/>
-              <a:t>9/1/2016</a:t>
+              <a:t>1/6/2018</a:t>
             </a:fld>
             <a:endParaRPr lang="en-US"/>
           </a:p>
@@ -1009,7 +1009,7 @@
           <a:p>
             <a:fld id="{1A73724E-0661-4337-B8C0-DE958CD8325F}" type="datetimeFigureOut">
               <a:rPr lang="en-US" smtClean="0"/>
-              <a:t>9/1/2016</a:t>
+              <a:t>1/6/2018</a:t>
             </a:fld>
             <a:endParaRPr lang="en-US"/>
           </a:p>
@@ -1241,7 +1241,7 @@
           <a:p>
             <a:fld id="{1A73724E-0661-4337-B8C0-DE958CD8325F}" type="datetimeFigureOut">
               <a:rPr lang="en-US" smtClean="0"/>
-              <a:t>9/1/2016</a:t>
+              <a:t>1/6/2018</a:t>
             </a:fld>
             <a:endParaRPr lang="en-US"/>
           </a:p>
@@ -1608,7 +1608,7 @@
           <a:p>
             <a:fld id="{1A73724E-0661-4337-B8C0-DE958CD8325F}" type="datetimeFigureOut">
               <a:rPr lang="en-US" smtClean="0"/>
-              <a:t>9/1/2016</a:t>
+              <a:t>1/6/2018</a:t>
             </a:fld>
             <a:endParaRPr lang="en-US"/>
           </a:p>
@@ -1726,7 +1726,7 @@
           <a:p>
             <a:fld id="{1A73724E-0661-4337-B8C0-DE958CD8325F}" type="datetimeFigureOut">
               <a:rPr lang="en-US" smtClean="0"/>
-              <a:t>9/1/2016</a:t>
+              <a:t>1/6/2018</a:t>
             </a:fld>
             <a:endParaRPr lang="en-US"/>
           </a:p>
@@ -1821,7 +1821,7 @@
           <a:p>
             <a:fld id="{1A73724E-0661-4337-B8C0-DE958CD8325F}" type="datetimeFigureOut">
               <a:rPr lang="en-US" smtClean="0"/>
-              <a:t>9/1/2016</a:t>
+              <a:t>1/6/2018</a:t>
             </a:fld>
             <a:endParaRPr lang="en-US"/>
           </a:p>
@@ -2098,7 +2098,7 @@
           <a:p>
             <a:fld id="{1A73724E-0661-4337-B8C0-DE958CD8325F}" type="datetimeFigureOut">
               <a:rPr lang="en-US" smtClean="0"/>
-              <a:t>9/1/2016</a:t>
+              <a:t>1/6/2018</a:t>
             </a:fld>
             <a:endParaRPr lang="en-US"/>
           </a:p>
@@ -2351,7 +2351,7 @@
           <a:p>
             <a:fld id="{1A73724E-0661-4337-B8C0-DE958CD8325F}" type="datetimeFigureOut">
               <a:rPr lang="en-US" smtClean="0"/>
-              <a:t>9/1/2016</a:t>
+              <a:t>1/6/2018</a:t>
             </a:fld>
             <a:endParaRPr lang="en-US"/>
           </a:p>
@@ -2564,7 +2564,7 @@
           <a:p>
             <a:fld id="{1A73724E-0661-4337-B8C0-DE958CD8325F}" type="datetimeFigureOut">
               <a:rPr lang="en-US" smtClean="0"/>
-              <a:t>9/1/2016</a:t>
+              <a:t>1/6/2018</a:t>
             </a:fld>
             <a:endParaRPr lang="en-US"/>
           </a:p>
@@ -3494,9 +3494,10 @@
                 <a:buChar char="•"/>
               </a:pPr>
               <a:r>
-                <a:rPr lang="en-US" sz="2000" dirty="0" smtClean="0"/>
-                <a:t>Log</a:t>
+                <a:rPr lang="en-US" sz="2000" dirty="0" err="1" smtClean="0"/>
+                <a:t>DataLogger</a:t>
               </a:r>
+              <a:endParaRPr lang="en-US" sz="2000" dirty="0" smtClean="0"/>
             </a:p>
             <a:p>
               <a:pPr marL="285750" indent="-285750" defTabSz="755650">
@@ -3514,12 +3515,9 @@
               </a:pPr>
               <a:r>
                 <a:rPr lang="en-US" sz="2000" dirty="0" smtClean="0"/>
-                <a:t>AMC </a:t>
+                <a:t>MODCOD Spec</a:t>
               </a:r>
-              <a:r>
-                <a:rPr lang="en-US" sz="2000" dirty="0" smtClean="0"/>
-                <a:t>Spec</a:t>
-              </a:r>
+              <a:endParaRPr lang="en-US" sz="2000" dirty="0" smtClean="0"/>
             </a:p>
             <a:p>
               <a:pPr marL="285750" indent="-285750" defTabSz="755650">
@@ -3537,11 +3535,7 @@
               </a:pPr>
               <a:r>
                 <a:rPr lang="en-US" sz="2000" dirty="0" smtClean="0"/>
-                <a:t>Test </a:t>
-              </a:r>
-              <a:r>
-                <a:rPr lang="en-US" sz="2000" dirty="0" smtClean="0"/>
-                <a:t>Routines</a:t>
+                <a:t>Test Routines</a:t>
               </a:r>
               <a:endParaRPr lang="en-US" sz="2000" dirty="0"/>
             </a:p>
@@ -3839,9 +3833,14 @@
               </a:spcAft>
             </a:pPr>
             <a:r>
-              <a:rPr lang="en-US" sz="2000" dirty="0" smtClean="0"/>
-              <a:t>Transponder()</a:t>
-            </a:r>
+              <a:rPr lang="en-US" dirty="0" err="1" smtClean="0"/>
+              <a:t>Transponder.set</a:t>
+            </a:r>
+            <a:r>
+              <a:rPr lang="en-US" dirty="0" smtClean="0"/>
+              <a:t>()</a:t>
+            </a:r>
+            <a:endParaRPr lang="en-US" dirty="0" smtClean="0"/>
           </a:p>
           <a:p>
             <a:pPr marL="0" lvl="1" defTabSz="844550">
@@ -3856,14 +3855,14 @@
               </a:spcAft>
             </a:pPr>
             <a:r>
-              <a:rPr lang="en-US" sz="2000" dirty="0" err="1" smtClean="0"/>
-              <a:t>Log.output</a:t>
-            </a:r>
-            <a:r>
-              <a:rPr lang="en-US" sz="2000" dirty="0" smtClean="0"/>
-              <a:t>(file)</a:t>
-            </a:r>
-            <a:endParaRPr lang="en-US" sz="2000" dirty="0"/>
+              <a:rPr lang="en-US" dirty="0" err="1" smtClean="0"/>
+              <a:t>DataLogger.push</a:t>
+            </a:r>
+            <a:r>
+              <a:rPr lang="en-US" dirty="0" smtClean="0"/>
+              <a:t>()</a:t>
+            </a:r>
+            <a:endParaRPr lang="en-US" dirty="0"/>
           </a:p>
           <a:p>
             <a:pPr marL="0" lvl="1" defTabSz="844550">
@@ -3878,14 +3877,14 @@
               </a:spcAft>
             </a:pPr>
             <a:r>
-              <a:rPr lang="en-US" sz="2000" dirty="0" err="1" smtClean="0"/>
-              <a:t>DDSS_Test</a:t>
-            </a:r>
-            <a:r>
-              <a:rPr lang="en-US" sz="2000" dirty="0" smtClean="0"/>
+              <a:rPr lang="en-US" dirty="0" err="1" smtClean="0"/>
+              <a:t>MODCOD.getQEF</a:t>
+            </a:r>
+            <a:r>
+              <a:rPr lang="en-US" dirty="0" smtClean="0"/>
               <a:t>()</a:t>
             </a:r>
-            <a:endParaRPr lang="en-US" sz="2000" dirty="0" smtClean="0"/>
+            <a:endParaRPr lang="en-US" dirty="0" smtClean="0"/>
           </a:p>
           <a:p>
             <a:pPr marL="0" lvl="1" defTabSz="844550">
@@ -3900,14 +3899,14 @@
               </a:spcAft>
             </a:pPr>
             <a:r>
-              <a:rPr lang="en-US" sz="2000" dirty="0" err="1" smtClean="0"/>
-              <a:t>LNB_Test</a:t>
-            </a:r>
-            <a:r>
-              <a:rPr lang="en-US" sz="2000" dirty="0" smtClean="0"/>
+              <a:rPr lang="en-US" dirty="0" err="1" smtClean="0"/>
+              <a:t>sensitivitySweep</a:t>
+            </a:r>
+            <a:r>
+              <a:rPr lang="en-US" dirty="0" smtClean="0"/>
               <a:t>()</a:t>
             </a:r>
-            <a:endParaRPr lang="en-US" sz="2000" dirty="0" smtClean="0"/>
+            <a:endParaRPr lang="en-US" dirty="0" smtClean="0"/>
           </a:p>
           <a:p>
             <a:pPr marL="0" lvl="1" defTabSz="844550">
@@ -3921,7 +3920,7 @@
                 <a:spcPct val="15000"/>
               </a:spcAft>
             </a:pPr>
-            <a:endParaRPr lang="en-US" sz="2000" dirty="0"/>
+            <a:endParaRPr lang="en-US" dirty="0"/>
           </a:p>
           <a:p>
             <a:pPr marL="0" lvl="1" defTabSz="844550">
@@ -3935,7 +3934,7 @@
                 <a:spcPct val="15000"/>
               </a:spcAft>
             </a:pPr>
-            <a:endParaRPr lang="en-US" sz="2000" dirty="0"/>
+            <a:endParaRPr lang="en-US" dirty="0"/>
           </a:p>
         </p:txBody>
       </p:sp>
@@ -4102,7 +4101,6 @@
                 <a:rPr lang="en-US" sz="2000" dirty="0" smtClean="0"/>
                 <a:t>Measurement Routines</a:t>
               </a:r>
-              <a:endParaRPr lang="en-US" sz="2000" dirty="0" smtClean="0"/>
             </a:p>
             <a:p>
               <a:pPr marL="285750" indent="-285750" defTabSz="755650">
@@ -4449,17 +4447,14 @@
               </a:spcAft>
             </a:pPr>
             <a:r>
-              <a:rPr lang="en-US" sz="2000" dirty="0" err="1" smtClean="0"/>
-              <a:t>SLG.calibrate_imbalance</a:t>
-            </a:r>
-            <a:r>
-              <a:rPr lang="en-US" sz="2000" dirty="0" smtClean="0"/>
-              <a:t> </a:t>
-            </a:r>
-            <a:r>
-              <a:rPr lang="en-US" sz="2000" dirty="0" smtClean="0"/>
+              <a:rPr lang="en-US" dirty="0" err="1" smtClean="0"/>
+              <a:t>SLG.calibrateSPS</a:t>
+            </a:r>
+            <a:r>
+              <a:rPr lang="en-US" dirty="0" smtClean="0"/>
               <a:t>()</a:t>
             </a:r>
+            <a:endParaRPr lang="en-US" dirty="0" smtClean="0"/>
           </a:p>
           <a:p>
             <a:pPr marL="0" lvl="1" defTabSz="844550">
@@ -4474,21 +4469,14 @@
               </a:spcAft>
             </a:pPr>
             <a:r>
-              <a:rPr lang="en-US" sz="2000" dirty="0" err="1" smtClean="0"/>
-              <a:t>DUT.tune</a:t>
-            </a:r>
-            <a:r>
-              <a:rPr lang="en-US" sz="2000" dirty="0" smtClean="0"/>
-              <a:t>(</a:t>
-            </a:r>
-            <a:r>
-              <a:rPr lang="en-US" sz="2000" dirty="0" err="1" smtClean="0"/>
-              <a:t>txp</a:t>
-            </a:r>
-            <a:r>
-              <a:rPr lang="en-US" sz="2000" dirty="0" smtClean="0"/>
-              <a:t>)</a:t>
-            </a:r>
+              <a:rPr lang="en-US" dirty="0" err="1" smtClean="0"/>
+              <a:t>FSW.getChannelPower</a:t>
+            </a:r>
+            <a:r>
+              <a:rPr lang="en-US" dirty="0" smtClean="0"/>
+              <a:t>()</a:t>
+            </a:r>
+            <a:endParaRPr lang="en-US" dirty="0" smtClean="0"/>
           </a:p>
           <a:p>
             <a:pPr marL="0" lvl="1" defTabSz="844550">
@@ -4502,15 +4490,7 @@
                 <a:spcPct val="15000"/>
               </a:spcAft>
             </a:pPr>
-            <a:r>
-              <a:rPr lang="en-US" sz="2000" dirty="0" err="1" smtClean="0"/>
-              <a:t>FSW.meas_pwr</a:t>
-            </a:r>
-            <a:r>
-              <a:rPr lang="en-US" sz="2000" dirty="0" smtClean="0"/>
-              <a:t>()</a:t>
-            </a:r>
-            <a:endParaRPr lang="en-US" sz="2000" dirty="0" smtClean="0"/>
+            <a:endParaRPr lang="en-US" dirty="0"/>
           </a:p>
           <a:p>
             <a:pPr marL="0" lvl="1" defTabSz="844550">
@@ -4524,21 +4504,7 @@
                 <a:spcPct val="15000"/>
               </a:spcAft>
             </a:pPr>
-            <a:endParaRPr lang="en-US" sz="2000" dirty="0"/>
-          </a:p>
-          <a:p>
-            <a:pPr marL="0" lvl="1" defTabSz="844550">
-              <a:lnSpc>
-                <a:spcPct val="90000"/>
-              </a:lnSpc>
-              <a:spcBef>
-                <a:spcPct val="0"/>
-              </a:spcBef>
-              <a:spcAft>
-                <a:spcPct val="15000"/>
-              </a:spcAft>
-            </a:pPr>
-            <a:endParaRPr lang="en-US" sz="2000" dirty="0" smtClean="0"/>
+            <a:endParaRPr lang="en-US" dirty="0" smtClean="0"/>
           </a:p>
         </p:txBody>
       </p:sp>
@@ -4740,8 +4706,9 @@
               </a:pPr>
               <a:r>
                 <a:rPr lang="en-US" sz="1600" dirty="0" smtClean="0"/>
-                <a:t>FSQ, FSW</a:t>
+                <a:t>FSW, VTR</a:t>
               </a:r>
+              <a:endParaRPr lang="en-US" sz="1600" dirty="0" smtClean="0"/>
             </a:p>
             <a:p>
               <a:pPr marL="285750" indent="-285750" defTabSz="755650">
@@ -4776,9 +4743,16 @@
               </a:pPr>
               <a:r>
                 <a:rPr lang="en-US" sz="1600" dirty="0" smtClean="0"/>
-                <a:t>AIM, LNB</a:t>
+                <a:t>STB</a:t>
               </a:r>
-              <a:endParaRPr lang="en-US" sz="1600" dirty="0" smtClean="0"/>
+              <a:r>
+                <a:rPr lang="en-US" sz="1600" dirty="0" smtClean="0"/>
+                <a:t>, </a:t>
+              </a:r>
+              <a:r>
+                <a:rPr lang="en-US" sz="1600" dirty="0" smtClean="0"/>
+                <a:t>LNB</a:t>
+              </a:r>
             </a:p>
             <a:p>
               <a:pPr marL="0" lvl="1" defTabSz="1555750">
@@ -4955,14 +4929,22 @@
                 </a:spcAft>
               </a:pPr>
               <a:r>
-                <a:rPr lang="en-US" sz="2200" dirty="0" smtClean="0">
+                <a:rPr lang="en-US" dirty="0" smtClean="0">
                   <a:solidFill>
                     <a:schemeClr val="tx1"/>
                   </a:solidFill>
                 </a:rPr>
-                <a:t>Equipment Ctrl</a:t>
+                <a:t>Equipment </a:t>
               </a:r>
-              <a:endParaRPr lang="en-US" sz="2200" dirty="0">
+              <a:r>
+                <a:rPr lang="en-US" dirty="0" smtClean="0">
+                  <a:solidFill>
+                    <a:schemeClr val="tx1"/>
+                  </a:solidFill>
+                </a:rPr>
+                <a:t>Control</a:t>
+              </a:r>
+              <a:endParaRPr lang="en-US" dirty="0">
                 <a:solidFill>
                   <a:schemeClr val="tx1"/>
                 </a:solidFill>
@@ -5098,13 +5080,14 @@
               </a:spcAft>
             </a:pPr>
             <a:r>
-              <a:rPr lang="en-US" sz="2000" dirty="0" err="1" smtClean="0"/>
-              <a:t>Set_PWR</a:t>
-            </a:r>
-            <a:r>
-              <a:rPr lang="en-US" sz="2000" dirty="0" smtClean="0"/>
+              <a:rPr lang="en-US" dirty="0" err="1" smtClean="0"/>
+              <a:t>SLG.setPower</a:t>
+            </a:r>
+            <a:r>
+              <a:rPr lang="en-US" dirty="0" smtClean="0"/>
               <a:t>()</a:t>
             </a:r>
+            <a:endParaRPr lang="en-US" dirty="0" smtClean="0"/>
           </a:p>
           <a:p>
             <a:pPr marL="0" lvl="1" defTabSz="844550">
@@ -5119,13 +5102,14 @@
               </a:spcAft>
             </a:pPr>
             <a:r>
-              <a:rPr lang="en-US" sz="2000" dirty="0" err="1" smtClean="0"/>
-              <a:t>Set_Noise</a:t>
-            </a:r>
-            <a:r>
-              <a:rPr lang="en-US" sz="2000" dirty="0" smtClean="0"/>
+              <a:rPr lang="en-US" dirty="0" err="1" smtClean="0"/>
+              <a:t>SFU.setNoise</a:t>
+            </a:r>
+            <a:r>
+              <a:rPr lang="en-US" dirty="0" smtClean="0"/>
               <a:t>()</a:t>
             </a:r>
+            <a:endParaRPr lang="en-US" dirty="0" smtClean="0"/>
           </a:p>
           <a:p>
             <a:pPr marL="0" lvl="1" defTabSz="844550">
@@ -5140,13 +5124,14 @@
               </a:spcAft>
             </a:pPr>
             <a:r>
-              <a:rPr lang="en-US" sz="2000" dirty="0" err="1" smtClean="0"/>
-              <a:t>Set_Freq</a:t>
-            </a:r>
-            <a:r>
-              <a:rPr lang="en-US" sz="2000" dirty="0" smtClean="0"/>
+              <a:rPr lang="en-US" dirty="0" err="1" smtClean="0"/>
+              <a:t>VTR.setFrequency</a:t>
+            </a:r>
+            <a:r>
+              <a:rPr lang="en-US" dirty="0" smtClean="0"/>
               <a:t>()</a:t>
             </a:r>
+            <a:endParaRPr lang="en-US" dirty="0" smtClean="0"/>
           </a:p>
           <a:p>
             <a:pPr marL="0" lvl="1" defTabSz="844550">
@@ -5161,13 +5146,14 @@
               </a:spcAft>
             </a:pPr>
             <a:r>
-              <a:rPr lang="en-US" sz="2000" dirty="0" err="1" smtClean="0"/>
-              <a:t>Set_BW</a:t>
-            </a:r>
-            <a:r>
-              <a:rPr lang="en-US" sz="2000" dirty="0" smtClean="0"/>
+              <a:rPr lang="en-US" dirty="0" err="1" smtClean="0"/>
+              <a:t>FSW.setSpan</a:t>
+            </a:r>
+            <a:r>
+              <a:rPr lang="en-US" dirty="0" smtClean="0"/>
               <a:t>()</a:t>
             </a:r>
+            <a:endParaRPr lang="en-US" dirty="0" smtClean="0"/>
           </a:p>
           <a:p>
             <a:pPr marL="0" lvl="1" defTabSz="844550">
@@ -5182,11 +5168,32 @@
               </a:spcAft>
             </a:pPr>
             <a:r>
-              <a:rPr lang="en-US" sz="2000" dirty="0" err="1" smtClean="0"/>
-              <a:t>Get_SNR</a:t>
-            </a:r>
-            <a:r>
-              <a:rPr lang="en-US" sz="2000" dirty="0" smtClean="0"/>
+              <a:rPr lang="en-US" dirty="0" err="1" smtClean="0"/>
+              <a:t>STB.getSNR</a:t>
+            </a:r>
+            <a:r>
+              <a:rPr lang="en-US" dirty="0" smtClean="0"/>
+              <a:t>()</a:t>
+            </a:r>
+          </a:p>
+          <a:p>
+            <a:pPr marL="0" lvl="1" defTabSz="844550">
+              <a:lnSpc>
+                <a:spcPct val="90000"/>
+              </a:lnSpc>
+              <a:spcBef>
+                <a:spcPct val="0"/>
+              </a:spcBef>
+              <a:spcAft>
+                <a:spcPct val="15000"/>
+              </a:spcAft>
+            </a:pPr>
+            <a:r>
+              <a:rPr lang="en-US" dirty="0" err="1" smtClean="0"/>
+              <a:t>STB.getBER</a:t>
+            </a:r>
+            <a:r>
+              <a:rPr lang="en-US" dirty="0" smtClean="0"/>
               <a:t>()</a:t>
             </a:r>
             <a:endParaRPr lang="en-US" dirty="0"/>

</xml_diff>

<commit_message>
Fixed software stack image in Summary docs
</commit_message>
<xml_diff>
--- a/docs/_static/diagrams1.pptx
+++ b/docs/_static/diagrams1.pptx
@@ -3517,7 +3517,6 @@
                 <a:rPr lang="en-US" sz="2000" dirty="0" smtClean="0"/>
                 <a:t>MODCOD Spec</a:t>
               </a:r>
-              <a:endParaRPr lang="en-US" sz="2000" dirty="0" smtClean="0"/>
             </a:p>
             <a:p>
               <a:pPr marL="285750" indent="-285750" defTabSz="755650">
@@ -3840,7 +3839,6 @@
               <a:rPr lang="en-US" dirty="0" smtClean="0"/>
               <a:t>()</a:t>
             </a:r>
-            <a:endParaRPr lang="en-US" dirty="0" smtClean="0"/>
           </a:p>
           <a:p>
             <a:pPr marL="0" lvl="1" defTabSz="844550">
@@ -3884,7 +3882,6 @@
               <a:rPr lang="en-US" dirty="0" smtClean="0"/>
               <a:t>()</a:t>
             </a:r>
-            <a:endParaRPr lang="en-US" dirty="0" smtClean="0"/>
           </a:p>
           <a:p>
             <a:pPr marL="0" lvl="1" defTabSz="844550">
@@ -3906,7 +3903,6 @@
               <a:rPr lang="en-US" dirty="0" smtClean="0"/>
               <a:t>()</a:t>
             </a:r>
-            <a:endParaRPr lang="en-US" dirty="0" smtClean="0"/>
           </a:p>
           <a:p>
             <a:pPr marL="0" lvl="1" defTabSz="844550">
@@ -4454,7 +4450,6 @@
               <a:rPr lang="en-US" dirty="0" smtClean="0"/>
               <a:t>()</a:t>
             </a:r>
-            <a:endParaRPr lang="en-US" dirty="0" smtClean="0"/>
           </a:p>
           <a:p>
             <a:pPr marL="0" lvl="1" defTabSz="844550">
@@ -4476,7 +4471,6 @@
               <a:rPr lang="en-US" dirty="0" smtClean="0"/>
               <a:t>()</a:t>
             </a:r>
-            <a:endParaRPr lang="en-US" dirty="0" smtClean="0"/>
           </a:p>
           <a:p>
             <a:pPr marL="0" lvl="1" defTabSz="844550">
@@ -4708,7 +4702,6 @@
                 <a:rPr lang="en-US" sz="1600" dirty="0" smtClean="0"/>
                 <a:t>FSW, VTR</a:t>
               </a:r>
-              <a:endParaRPr lang="en-US" sz="1600" dirty="0" smtClean="0"/>
             </a:p>
             <a:p>
               <a:pPr marL="285750" indent="-285750" defTabSz="755650">
@@ -4743,15 +4736,7 @@
               </a:pPr>
               <a:r>
                 <a:rPr lang="en-US" sz="1600" dirty="0" smtClean="0"/>
-                <a:t>STB</a:t>
-              </a:r>
-              <a:r>
-                <a:rPr lang="en-US" sz="1600" dirty="0" smtClean="0"/>
-                <a:t>, </a:t>
-              </a:r>
-              <a:r>
-                <a:rPr lang="en-US" sz="1600" dirty="0" smtClean="0"/>
-                <a:t>LNB</a:t>
+                <a:t>STB, LNB</a:t>
               </a:r>
             </a:p>
             <a:p>
@@ -4934,15 +4919,7 @@
                     <a:schemeClr val="tx1"/>
                   </a:solidFill>
                 </a:rPr>
-                <a:t>Equipment </a:t>
-              </a:r>
-              <a:r>
-                <a:rPr lang="en-US" dirty="0" smtClean="0">
-                  <a:solidFill>
-                    <a:schemeClr val="tx1"/>
-                  </a:solidFill>
-                </a:rPr>
-                <a:t>Control</a:t>
+                <a:t>Equipment Control</a:t>
               </a:r>
               <a:endParaRPr lang="en-US" dirty="0">
                 <a:solidFill>
@@ -5087,7 +5064,6 @@
               <a:rPr lang="en-US" dirty="0" smtClean="0"/>
               <a:t>()</a:t>
             </a:r>
-            <a:endParaRPr lang="en-US" dirty="0" smtClean="0"/>
           </a:p>
           <a:p>
             <a:pPr marL="0" lvl="1" defTabSz="844550">
@@ -5109,7 +5085,6 @@
               <a:rPr lang="en-US" dirty="0" smtClean="0"/>
               <a:t>()</a:t>
             </a:r>
-            <a:endParaRPr lang="en-US" dirty="0" smtClean="0"/>
           </a:p>
           <a:p>
             <a:pPr marL="0" lvl="1" defTabSz="844550">
@@ -5131,7 +5106,6 @@
               <a:rPr lang="en-US" dirty="0" smtClean="0"/>
               <a:t>()</a:t>
             </a:r>
-            <a:endParaRPr lang="en-US" dirty="0" smtClean="0"/>
           </a:p>
           <a:p>
             <a:pPr marL="0" lvl="1" defTabSz="844550">
@@ -5153,7 +5127,6 @@
               <a:rPr lang="en-US" dirty="0" smtClean="0"/>
               <a:t>()</a:t>
             </a:r>
-            <a:endParaRPr lang="en-US" dirty="0" smtClean="0"/>
           </a:p>
           <a:p>
             <a:pPr marL="0" lvl="1" defTabSz="844550">

</xml_diff>